<commit_message>
tried to expunge 'mixed data'
</commit_message>
<xml_diff>
--- a/Slides/Lesson 1.2 The Kinds of Data.pptx
+++ b/Slides/Lesson 1.2 The Kinds of Data.pptx
@@ -5,7 +5,7 @@
     <p:sldMasterId id="2147483648" r:id="rId1"/>
   </p:sldMasterIdLst>
   <p:notesMasterIdLst>
-    <p:notesMasterId r:id="rId16"/>
+    <p:notesMasterId r:id="rId17"/>
   </p:notesMasterIdLst>
   <p:sldIdLst>
     <p:sldId id="257" r:id="rId2"/>
@@ -18,10 +18,11 @@
     <p:sldId id="340" r:id="rId9"/>
     <p:sldId id="343" r:id="rId10"/>
     <p:sldId id="260" r:id="rId11"/>
-    <p:sldId id="341" r:id="rId12"/>
-    <p:sldId id="342" r:id="rId13"/>
-    <p:sldId id="371" r:id="rId14"/>
-    <p:sldId id="372" r:id="rId15"/>
+    <p:sldId id="373" r:id="rId12"/>
+    <p:sldId id="341" r:id="rId13"/>
+    <p:sldId id="342" r:id="rId14"/>
+    <p:sldId id="374" r:id="rId15"/>
+    <p:sldId id="372" r:id="rId16"/>
   </p:sldIdLst>
   <p:sldSz cx="9144000" cy="6858000" type="screen4x3"/>
   <p:notesSz cx="6858000" cy="9144000"/>
@@ -135,9 +136,10 @@
             <p14:sldId id="340"/>
             <p14:sldId id="343"/>
             <p14:sldId id="260"/>
+            <p14:sldId id="373"/>
             <p14:sldId id="341"/>
             <p14:sldId id="342"/>
-            <p14:sldId id="371"/>
+            <p14:sldId id="374"/>
             <p14:sldId id="372"/>
           </p14:sldIdLst>
         </p14:section>
@@ -244,7 +246,7 @@
             <a:fld id="{E3057DDA-BF5C-4879-9957-16E91151DE1E}" type="datetimeFigureOut">
               <a:rPr lang="en-US" smtClean="0"/>
               <a:pPr/>
-              <a:t>7/25/2016</a:t>
+              <a:t>9/13/2017</a:t>
             </a:fld>
             <a:endParaRPr lang="en-US"/>
           </a:p>
@@ -784,99 +786,6 @@
 </p:notes>
 </file>
 
-<file path=ppt/notesSlides/notesSlide4.xml><?xml version="1.0" encoding="utf-8"?>
-<p:notes xmlns:a="http://schemas.openxmlformats.org/drawingml/2006/main" xmlns:r="http://schemas.openxmlformats.org/officeDocument/2006/relationships" xmlns:p="http://schemas.openxmlformats.org/presentationml/2006/main">
-  <p:cSld>
-    <p:spTree>
-      <p:nvGrpSpPr>
-        <p:cNvPr id="1" name=""/>
-        <p:cNvGrpSpPr/>
-        <p:nvPr/>
-      </p:nvGrpSpPr>
-      <p:grpSpPr>
-        <a:xfrm>
-          <a:off x="0" y="0"/>
-          <a:ext cx="0" cy="0"/>
-          <a:chOff x="0" y="0"/>
-          <a:chExt cx="0" cy="0"/>
-        </a:xfrm>
-      </p:grpSpPr>
-      <p:sp>
-        <p:nvSpPr>
-          <p:cNvPr id="2" name="Slide Image Placeholder 1"/>
-          <p:cNvSpPr>
-            <a:spLocks noGrp="1" noRot="1" noChangeAspect="1"/>
-          </p:cNvSpPr>
-          <p:nvPr>
-            <p:ph type="sldImg"/>
-          </p:nvPr>
-        </p:nvSpPr>
-        <p:spPr/>
-      </p:sp>
-      <p:sp>
-        <p:nvSpPr>
-          <p:cNvPr id="3" name="Notes Placeholder 2"/>
-          <p:cNvSpPr>
-            <a:spLocks noGrp="1"/>
-          </p:cNvSpPr>
-          <p:nvPr>
-            <p:ph type="body" idx="1"/>
-          </p:nvPr>
-        </p:nvSpPr>
-        <p:spPr/>
-        <p:txBody>
-          <a:bodyPr/>
-          <a:lstStyle/>
-          <a:p>
-            <a:endParaRPr lang="en-US" sz="1200" b="1" kern="1200" dirty="0">
-              <a:solidFill>
-                <a:schemeClr val="tx1"/>
-              </a:solidFill>
-              <a:effectLst/>
-              <a:latin typeface="+mn-lt"/>
-              <a:ea typeface="+mn-ea"/>
-              <a:cs typeface="+mn-cs"/>
-            </a:endParaRPr>
-          </a:p>
-        </p:txBody>
-      </p:sp>
-      <p:sp>
-        <p:nvSpPr>
-          <p:cNvPr id="4" name="Slide Number Placeholder 3"/>
-          <p:cNvSpPr>
-            <a:spLocks noGrp="1"/>
-          </p:cNvSpPr>
-          <p:nvPr>
-            <p:ph type="sldNum" sz="quarter" idx="10"/>
-          </p:nvPr>
-        </p:nvSpPr>
-        <p:spPr/>
-        <p:txBody>
-          <a:bodyPr/>
-          <a:lstStyle/>
-          <a:p>
-            <a:fld id="{2579440B-E791-2640-8935-69975A005A8A}" type="slidenum">
-              <a:rPr lang="en-US" smtClean="0"/>
-              <a:pPr/>
-              <a:t>13</a:t>
-            </a:fld>
-            <a:endParaRPr lang="en-US"/>
-          </a:p>
-        </p:txBody>
-      </p:sp>
-    </p:spTree>
-    <p:extLst>
-      <p:ext uri="{BB962C8B-B14F-4D97-AF65-F5344CB8AC3E}">
-        <p14:creationId xmlns:p14="http://schemas.microsoft.com/office/powerpoint/2010/main" val="904606111"/>
-      </p:ext>
-    </p:extLst>
-  </p:cSld>
-  <p:clrMapOvr>
-    <a:masterClrMapping/>
-  </p:clrMapOvr>
-</p:notes>
-</file>
-
 <file path=ppt/slideLayouts/slideLayout1.xml><?xml version="1.0" encoding="utf-8"?>
 <p:sldLayout xmlns:a="http://schemas.openxmlformats.org/drawingml/2006/main" xmlns:r="http://schemas.openxmlformats.org/officeDocument/2006/relationships" xmlns:p="http://schemas.openxmlformats.org/presentationml/2006/main" type="title" preserve="1">
   <p:cSld name="Title Slide">
@@ -1064,7 +973,7 @@
           <a:p>
             <a:fld id="{768B3A28-1884-497D-94C5-27227826CE2C}" type="datetime1">
               <a:rPr lang="en-US" smtClean="0"/>
-              <a:t>7/25/2016</a:t>
+              <a:t>9/13/2017</a:t>
             </a:fld>
             <a:endParaRPr lang="en-US"/>
           </a:p>
@@ -1333,7 +1242,7 @@
           <a:p>
             <a:fld id="{B8262C03-9B91-44B2-B7D5-2A844E6680F8}" type="datetime1">
               <a:rPr lang="en-US" smtClean="0"/>
-              <a:t>7/25/2016</a:t>
+              <a:t>9/13/2017</a:t>
             </a:fld>
             <a:endParaRPr lang="en-US"/>
           </a:p>
@@ -1518,7 +1427,7 @@
           <a:p>
             <a:fld id="{B11DCD3A-F44B-4ECF-B365-54BE99BB4BEA}" type="datetime1">
               <a:rPr lang="en-US" smtClean="0"/>
-              <a:t>7/25/2016</a:t>
+              <a:t>9/13/2017</a:t>
             </a:fld>
             <a:endParaRPr lang="en-US"/>
           </a:p>
@@ -1713,7 +1622,7 @@
           <a:p>
             <a:fld id="{94377941-97D9-4840-A51B-C8DAEDA2815C}" type="datetime1">
               <a:rPr lang="en-US" smtClean="0"/>
-              <a:t>7/25/2016</a:t>
+              <a:t>9/13/2017</a:t>
             </a:fld>
             <a:endParaRPr lang="en-US"/>
           </a:p>
@@ -1910,7 +1819,7 @@
           <a:p>
             <a:fld id="{AB7F5B1C-135C-4619-A2DE-25131AF5278A}" type="datetime1">
               <a:rPr lang="en-US" smtClean="0"/>
-              <a:t>7/25/2016</a:t>
+              <a:t>9/13/2017</a:t>
             </a:fld>
             <a:endParaRPr lang="en-US"/>
           </a:p>
@@ -2008,10 +1917,29 @@
           </p:nvPr>
         </p:nvSpPr>
         <p:spPr/>
-        <p:txBody>
-          <a:bodyPr/>
-          <a:lstStyle/>
-          <a:p>
+        <p:style>
+          <a:lnRef idx="2">
+            <a:schemeClr val="accent1"/>
+          </a:lnRef>
+          <a:fillRef idx="1">
+            <a:schemeClr val="lt1"/>
+          </a:fillRef>
+          <a:effectRef idx="0">
+            <a:schemeClr val="accent1"/>
+          </a:effectRef>
+          <a:fontRef idx="none"/>
+        </p:style>
+        <p:txBody>
+          <a:bodyPr vert="horz" lIns="91440" tIns="45720" rIns="91440" bIns="45720" rtlCol="0" anchor="ctr">
+            <a:normAutofit/>
+          </a:bodyPr>
+          <a:lstStyle>
+            <a:lvl1pPr>
+              <a:defRPr lang="en-US"/>
+            </a:lvl1pPr>
+          </a:lstStyle>
+          <a:p>
+            <a:pPr lvl="0"/>
             <a:r>
               <a:rPr lang="en-US"/>
               <a:t>Click to edit Master title style</a:t>
@@ -2103,7 +2031,7 @@
           <a:p>
             <a:fld id="{29517BA8-26BA-4B7C-A41A-804B81F83A36}" type="datetime1">
               <a:rPr lang="en-US" smtClean="0"/>
-              <a:t>7/25/2016</a:t>
+              <a:t>9/13/2017</a:t>
             </a:fld>
             <a:endParaRPr lang="en-US"/>
           </a:p>
@@ -2365,7 +2293,7 @@
           <a:p>
             <a:fld id="{E54FABC5-F62F-49DD-A24E-5C2CE15A3D87}" type="datetime1">
               <a:rPr lang="en-US" smtClean="0"/>
-              <a:t>7/25/2016</a:t>
+              <a:t>9/13/2017</a:t>
             </a:fld>
             <a:endParaRPr lang="en-US"/>
           </a:p>
@@ -2667,7 +2595,7 @@
           <a:p>
             <a:fld id="{510AAC56-4986-4B63-9F74-D47EE64ADD9E}" type="datetime1">
               <a:rPr lang="en-US" smtClean="0"/>
-              <a:t>7/25/2016</a:t>
+              <a:t>9/13/2017</a:t>
             </a:fld>
             <a:endParaRPr lang="en-US"/>
           </a:p>
@@ -3103,7 +3031,7 @@
           <a:p>
             <a:fld id="{FCC14660-E407-48B8-9CF0-DD79C3F69AD0}" type="datetime1">
               <a:rPr lang="en-US" smtClean="0"/>
-              <a:t>7/25/2016</a:t>
+              <a:t>9/13/2017</a:t>
             </a:fld>
             <a:endParaRPr lang="en-US"/>
           </a:p>
@@ -3237,7 +3165,7 @@
           <a:p>
             <a:fld id="{9B0DE907-AEDA-4EE9-869A-B21DA6DC498D}" type="datetime1">
               <a:rPr lang="en-US" smtClean="0"/>
-              <a:t>7/25/2016</a:t>
+              <a:t>9/13/2017</a:t>
             </a:fld>
             <a:endParaRPr lang="en-US"/>
           </a:p>
@@ -3349,7 +3277,7 @@
           <a:p>
             <a:fld id="{38C540BA-3DB2-4124-8990-4661E7113E01}" type="datetime1">
               <a:rPr lang="en-US" smtClean="0"/>
-              <a:t>7/25/2016</a:t>
+              <a:t>9/13/2017</a:t>
             </a:fld>
             <a:endParaRPr lang="en-US"/>
           </a:p>
@@ -3641,7 +3569,7 @@
           <a:p>
             <a:fld id="{90F6EF63-9AC7-45BB-B551-A0640428FFFB}" type="datetime1">
               <a:rPr lang="en-US" smtClean="0"/>
-              <a:t>7/25/2016</a:t>
+              <a:t>9/13/2017</a:t>
             </a:fld>
             <a:endParaRPr lang="en-US"/>
           </a:p>
@@ -4322,7 +4250,7 @@
             <a:p>
               <a:r>
                 <a:rPr lang="en-US" sz="1000" dirty="0"/>
-                <a:t>© Mitchell Wand, 2012-2014</a:t>
+                <a:t>© Mitchell Wand, 2012-2017</a:t>
               </a:r>
             </a:p>
             <a:p>
@@ -4445,7 +4373,7 @@
             </a:r>
             <a:r>
               <a:rPr lang="en-US" dirty="0"/>
-              <a:t>is data that takes on one of a few values.</a:t>
+              <a:t>is data that takes on one of a few alternative forms.</a:t>
             </a:r>
           </a:p>
           <a:p>
@@ -4457,7 +4385,7 @@
           <a:p>
             <a:r>
               <a:rPr lang="en-US" dirty="0"/>
-              <a:t>The data definition lists the possible values and their interpretation.</a:t>
+              <a:t>The data definition lists the possible forms and their interpretation.</a:t>
             </a:r>
           </a:p>
         </p:txBody>
@@ -4518,7 +4446,7 @@
       </p:grpSpPr>
       <p:sp>
         <p:nvSpPr>
-          <p:cNvPr id="4" name="Title 3"/>
+          <p:cNvPr id="2" name="Title 1"/>
           <p:cNvSpPr>
             <a:spLocks noGrp="1"/>
           </p:cNvSpPr>
@@ -4533,7 +4461,7 @@
           <a:p>
             <a:r>
               <a:rPr lang="en-US" dirty="0"/>
-              <a:t>4. Mixed Data</a:t>
+              <a:t>Examples</a:t>
             </a:r>
           </a:p>
         </p:txBody>
@@ -4550,57 +4478,97 @@
         </p:nvSpPr>
         <p:spPr/>
         <p:txBody>
-          <a:bodyPr/>
-          <a:lstStyle/>
-          <a:p>
-            <a:r>
-              <a:rPr lang="en-US" dirty="0"/>
-              <a:t>Our last kind of data (for today) is </a:t>
-            </a:r>
-            <a:r>
-              <a:rPr lang="en-US" i="1" dirty="0"/>
-              <a:t>mixed data</a:t>
-            </a:r>
-            <a:r>
-              <a:rPr lang="en-US" dirty="0"/>
-              <a:t>. </a:t>
-            </a:r>
-          </a:p>
-          <a:p>
-            <a:r>
-              <a:rPr lang="en-US" dirty="0"/>
-              <a:t>Often your data is in the form of alternatives, like itemization data, but one or more of the alternatives is actually compound data.</a:t>
-            </a:r>
-          </a:p>
-          <a:p>
-            <a:r>
-              <a:rPr lang="en-US" dirty="0"/>
-              <a:t>We call this </a:t>
-            </a:r>
-            <a:r>
-              <a:rPr lang="en-US" i="1" dirty="0">
-                <a:solidFill>
-                  <a:srgbClr val="FF0000"/>
-                </a:solidFill>
-              </a:rPr>
-              <a:t>mixed data</a:t>
-            </a:r>
-            <a:r>
-              <a:rPr lang="en-US" dirty="0"/>
-              <a:t>.</a:t>
-            </a:r>
-          </a:p>
-          <a:p>
-            <a:r>
-              <a:rPr lang="en-US" dirty="0"/>
-              <a:t>Compound data and itemization data are just special cases of mixed data.</a:t>
-            </a:r>
-          </a:p>
-        </p:txBody>
-      </p:sp>
-      <p:sp>
-        <p:nvSpPr>
-          <p:cNvPr id="2" name="Slide Number Placeholder 1"/>
+          <a:bodyPr>
+            <a:normAutofit/>
+          </a:bodyPr>
+          <a:lstStyle/>
+          <a:p>
+            <a:r>
+              <a:rPr lang="en-US" sz="2200" dirty="0"/>
+              <a:t>;; A </a:t>
+            </a:r>
+            <a:r>
+              <a:rPr lang="en-US" sz="2200" dirty="0" err="1"/>
+              <a:t>CupSize</a:t>
+            </a:r>
+            <a:r>
+              <a:rPr lang="en-US" sz="2200" dirty="0"/>
+              <a:t> is represented as one of the </a:t>
+            </a:r>
+          </a:p>
+          <a:p>
+            <a:r>
+              <a:rPr lang="en-US" sz="2200" dirty="0"/>
+              <a:t>;; following integers:</a:t>
+            </a:r>
+          </a:p>
+          <a:p>
+            <a:r>
+              <a:rPr lang="en-US" sz="2200" dirty="0"/>
+              <a:t>;; -- 8, 12, 16, 20, 30</a:t>
+            </a:r>
+          </a:p>
+          <a:p>
+            <a:r>
+              <a:rPr lang="en-US" sz="2200" dirty="0"/>
+              <a:t>;; INTERP: the cup size, in fluid ounces</a:t>
+            </a:r>
+          </a:p>
+          <a:p>
+            <a:endParaRPr lang="en-US" sz="2200" dirty="0"/>
+          </a:p>
+          <a:p>
+            <a:r>
+              <a:rPr lang="en-US" sz="2200" dirty="0"/>
+              <a:t>;; A </a:t>
+            </a:r>
+            <a:r>
+              <a:rPr lang="en-US" sz="2200" dirty="0" err="1"/>
+              <a:t>TrafficLightState</a:t>
+            </a:r>
+            <a:r>
+              <a:rPr lang="en-US" sz="2200" dirty="0"/>
+              <a:t> is represented as one of the</a:t>
+            </a:r>
+          </a:p>
+          <a:p>
+            <a:r>
+              <a:rPr lang="en-US" sz="2200" dirty="0"/>
+              <a:t>;; following strings:</a:t>
+            </a:r>
+          </a:p>
+          <a:p>
+            <a:r>
+              <a:rPr lang="en-US" sz="2200" dirty="0"/>
+              <a:t>;; -- "red"</a:t>
+            </a:r>
+          </a:p>
+          <a:p>
+            <a:r>
+              <a:rPr lang="en-US" sz="2200" dirty="0"/>
+              <a:t>;; -- "yellow"</a:t>
+            </a:r>
+          </a:p>
+          <a:p>
+            <a:r>
+              <a:rPr lang="en-US" sz="2200" dirty="0"/>
+              <a:t>;; -- "green"</a:t>
+            </a:r>
+          </a:p>
+          <a:p>
+            <a:r>
+              <a:rPr lang="en-US" sz="2200" dirty="0"/>
+              <a:t>;; INTERP: self-evident</a:t>
+            </a:r>
+          </a:p>
+          <a:p>
+            <a:endParaRPr lang="en-US" dirty="0"/>
+          </a:p>
+        </p:txBody>
+      </p:sp>
+      <p:sp>
+        <p:nvSpPr>
+          <p:cNvPr id="4" name="Slide Number Placeholder 3"/>
           <p:cNvSpPr>
             <a:spLocks noGrp="1"/>
           </p:cNvSpPr>
@@ -4625,7 +4593,7 @@
     </p:spTree>
     <p:extLst>
       <p:ext uri="{BB962C8B-B14F-4D97-AF65-F5344CB8AC3E}">
-        <p14:creationId xmlns:p14="http://schemas.microsoft.com/office/powerpoint/2010/main" val="1803176126"/>
+        <p14:creationId xmlns:p14="http://schemas.microsoft.com/office/powerpoint/2010/main" val="1548264144"/>
       </p:ext>
     </p:extLst>
   </p:cSld>
@@ -4654,7 +4622,7 @@
       </p:grpSpPr>
       <p:sp>
         <p:nvSpPr>
-          <p:cNvPr id="2" name="Title 1"/>
+          <p:cNvPr id="4" name="Title 3"/>
           <p:cNvSpPr>
             <a:spLocks noGrp="1"/>
           </p:cNvSpPr>
@@ -4664,19 +4632,21 @@
         </p:nvSpPr>
         <p:spPr/>
         <p:txBody>
-          <a:bodyPr/>
+          <a:bodyPr>
+            <a:normAutofit fontScale="90000"/>
+          </a:bodyPr>
           <a:lstStyle/>
           <a:p>
             <a:r>
               <a:rPr lang="en-US" dirty="0"/>
-              <a:t>Example of mixed data</a:t>
-            </a:r>
-          </a:p>
-        </p:txBody>
-      </p:sp>
-      <p:sp>
-        <p:nvSpPr>
-          <p:cNvPr id="3" name="Content Placeholder 2"/>
+              <a:t>One or more of the alternatives may be a compound</a:t>
+            </a:r>
+          </a:p>
+        </p:txBody>
+      </p:sp>
+      <p:sp>
+        <p:nvSpPr>
+          <p:cNvPr id="5" name="Content Placeholder 4"/>
           <p:cNvSpPr>
             <a:spLocks noGrp="1"/>
           </p:cNvSpPr>
@@ -4686,51 +4656,51 @@
         </p:nvSpPr>
         <p:spPr/>
         <p:txBody>
-          <a:bodyPr>
-            <a:normAutofit fontScale="92500"/>
-          </a:bodyPr>
-          <a:lstStyle/>
-          <a:p>
-            <a:pPr marL="0" indent="0">
-              <a:buNone/>
-            </a:pPr>
+          <a:bodyPr/>
+          <a:lstStyle/>
+          <a:p>
             <a:r>
               <a:rPr lang="en-US" dirty="0"/>
-              <a:t>In a wine bar, an order may be one of three things: a cup of coffee, a glass of wine, or a cup of tea. </a:t>
-            </a:r>
-          </a:p>
-          <a:p>
-            <a:pPr lvl="1"/>
+              <a:t>In the textbook (</a:t>
+            </a:r>
+            <a:r>
+              <a:rPr lang="en-US" dirty="0" err="1"/>
+              <a:t>HtDP</a:t>
+            </a:r>
             <a:r>
               <a:rPr lang="en-US" dirty="0"/>
-              <a:t>For the coffee, we need to specify the size (small, medium, or large) and type (this is a fancy bar, so it carries many types of coffee).  Also whether or not it should be served with milk.</a:t>
-            </a:r>
-          </a:p>
-          <a:p>
-            <a:pPr lvl="1"/>
+              <a:t>/2e) this is called </a:t>
+            </a:r>
+            <a:r>
+              <a:rPr lang="en-US" i="1" dirty="0">
+                <a:solidFill>
+                  <a:srgbClr val="FF0000"/>
+                </a:solidFill>
+              </a:rPr>
+              <a:t>mixed data</a:t>
+            </a:r>
             <a:r>
               <a:rPr lang="en-US" dirty="0"/>
-              <a:t>For the wine, we need to specify which vineyard and which year.  </a:t>
-            </a:r>
-          </a:p>
-          <a:p>
-            <a:pPr lvl="1"/>
+              <a:t>.</a:t>
+            </a:r>
+          </a:p>
+          <a:p>
             <a:r>
               <a:rPr lang="en-US" dirty="0"/>
-              <a:t>For tea, we need the size of the cup and the type of tea (this is a fancy bar, so it carries many types of tea).</a:t>
-            </a:r>
-          </a:p>
-          <a:p>
-            <a:endParaRPr lang="en-US" dirty="0"/>
-          </a:p>
-          <a:p>
-            <a:endParaRPr lang="en-US" dirty="0"/>
-          </a:p>
-        </p:txBody>
-      </p:sp>
-      <p:sp>
-        <p:nvSpPr>
-          <p:cNvPr id="4" name="Slide Number Placeholder 3"/>
+              <a:t>This is just itemization data where one or more of the alternatives is a compound.</a:t>
+            </a:r>
+          </a:p>
+          <a:p>
+            <a:r>
+              <a:rPr lang="en-US" dirty="0"/>
+              <a:t>This turns out to be a common situation.</a:t>
+            </a:r>
+          </a:p>
+        </p:txBody>
+      </p:sp>
+      <p:sp>
+        <p:nvSpPr>
+          <p:cNvPr id="2" name="Slide Number Placeholder 1"/>
           <p:cNvSpPr>
             <a:spLocks noGrp="1"/>
           </p:cNvSpPr>
@@ -4755,7 +4725,7 @@
     </p:spTree>
     <p:extLst>
       <p:ext uri="{BB962C8B-B14F-4D97-AF65-F5344CB8AC3E}">
-        <p14:creationId xmlns:p14="http://schemas.microsoft.com/office/powerpoint/2010/main" val="3984661016"/>
+        <p14:creationId xmlns:p14="http://schemas.microsoft.com/office/powerpoint/2010/main" val="1803176126"/>
       </p:ext>
     </p:extLst>
   </p:cSld>
@@ -4794,533 +4764,73 @@
         </p:nvSpPr>
         <p:spPr/>
         <p:txBody>
+          <a:bodyPr/>
+          <a:lstStyle/>
+          <a:p>
+            <a:r>
+              <a:rPr lang="en-US" dirty="0"/>
+              <a:t>Example</a:t>
+            </a:r>
+          </a:p>
+        </p:txBody>
+      </p:sp>
+      <p:sp>
+        <p:nvSpPr>
+          <p:cNvPr id="3" name="Content Placeholder 2"/>
+          <p:cNvSpPr>
+            <a:spLocks noGrp="1"/>
+          </p:cNvSpPr>
+          <p:nvPr>
+            <p:ph idx="1"/>
+          </p:nvPr>
+        </p:nvSpPr>
+        <p:spPr/>
+        <p:txBody>
           <a:bodyPr>
-            <a:normAutofit fontScale="90000"/>
+            <a:normAutofit fontScale="92500"/>
           </a:bodyPr>
           <a:lstStyle/>
           <a:p>
+            <a:pPr marL="0" indent="0">
+              <a:buNone/>
+            </a:pPr>
             <a:r>
               <a:rPr lang="en-US" dirty="0"/>
-              <a:t>Here's a summary of the different kinds of data</a:t>
-            </a:r>
-          </a:p>
-        </p:txBody>
-      </p:sp>
-      <p:graphicFrame>
-        <p:nvGraphicFramePr>
-          <p:cNvPr id="4" name="Table 3"/>
-          <p:cNvGraphicFramePr>
-            <a:graphicFrameLocks noGrp="1"/>
-          </p:cNvGraphicFramePr>
-          <p:nvPr>
-            <p:extLst>
-              <p:ext uri="{D42A27DB-BD31-4B8C-83A1-F6EECF244321}">
-                <p14:modId xmlns:p14="http://schemas.microsoft.com/office/powerpoint/2010/main" val="785617579"/>
-              </p:ext>
-            </p:extLst>
-          </p:nvPr>
-        </p:nvGraphicFramePr>
-        <p:xfrm>
-          <a:off x="228600" y="1752600"/>
-          <a:ext cx="8686800" cy="3017520"/>
-        </p:xfrm>
-        <a:graphic>
-          <a:graphicData uri="http://schemas.openxmlformats.org/drawingml/2006/table">
-            <a:tbl>
-              <a:tblPr firstRow="1" bandRow="1">
-                <a:tableStyleId>{5C22544A-7EE6-4342-B048-85BDC9FD1C3A}</a:tableStyleId>
-              </a:tblPr>
-              <a:tblGrid>
-                <a:gridCol w="2977427">
-                  <a:extLst>
-                    <a:ext uri="{9D8B030D-6E8A-4147-A177-3AD203B41FA5}">
-                      <a16:colId xmlns:a16="http://schemas.microsoft.com/office/drawing/2014/main" val="20000"/>
-                    </a:ext>
-                  </a:extLst>
-                </a:gridCol>
-                <a:gridCol w="5709373">
-                  <a:extLst>
-                    <a:ext uri="{9D8B030D-6E8A-4147-A177-3AD203B41FA5}">
-                      <a16:colId xmlns:a16="http://schemas.microsoft.com/office/drawing/2014/main" val="20001"/>
-                    </a:ext>
-                  </a:extLst>
-                </a:gridCol>
-              </a:tblGrid>
-              <a:tr h="370840">
-                <a:tc>
-                  <a:txBody>
-                    <a:bodyPr/>
-                    <a:lstStyle/>
-                    <a:p>
-                      <a:r>
-                        <a:rPr lang="en-US" sz="2400" dirty="0"/>
-                        <a:t>Kind of Information</a:t>
-                      </a:r>
-                    </a:p>
-                  </a:txBody>
-                  <a:tcPr/>
-                </a:tc>
-                <a:tc>
-                  <a:txBody>
-                    <a:bodyPr/>
-                    <a:lstStyle/>
-                    <a:p>
-                      <a:r>
-                        <a:rPr lang="en-US" sz="2400" dirty="0"/>
-                        <a:t>Example</a:t>
-                      </a:r>
-                    </a:p>
-                  </a:txBody>
-                  <a:tcPr/>
-                </a:tc>
-                <a:extLst>
-                  <a:ext uri="{0D108BD9-81ED-4DB2-BD59-A6C34878D82A}">
-                    <a16:rowId xmlns:a16="http://schemas.microsoft.com/office/drawing/2014/main" val="10000"/>
-                  </a:ext>
-                </a:extLst>
-              </a:tr>
-              <a:tr h="370840">
-                <a:tc>
-                  <a:txBody>
-                    <a:bodyPr/>
-                    <a:lstStyle/>
-                    <a:p>
-                      <a:r>
-                        <a:rPr lang="en-US" sz="2400" dirty="0"/>
-                        <a:t>Scalar</a:t>
-                      </a:r>
-                    </a:p>
-                  </a:txBody>
-                  <a:tcPr/>
-                </a:tc>
-                <a:tc>
-                  <a:txBody>
-                    <a:bodyPr/>
-                    <a:lstStyle/>
-                    <a:p>
-                      <a:r>
-                        <a:rPr lang="en-US" sz="2400" dirty="0"/>
-                        <a:t>Temperature</a:t>
-                      </a:r>
-                    </a:p>
-                  </a:txBody>
-                  <a:tcPr/>
-                </a:tc>
-                <a:extLst>
-                  <a:ext uri="{0D108BD9-81ED-4DB2-BD59-A6C34878D82A}">
-                    <a16:rowId xmlns:a16="http://schemas.microsoft.com/office/drawing/2014/main" val="10001"/>
-                  </a:ext>
-                </a:extLst>
-              </a:tr>
-              <a:tr h="370840">
-                <a:tc>
-                  <a:txBody>
-                    <a:bodyPr/>
-                    <a:lstStyle/>
-                    <a:p>
-                      <a:r>
-                        <a:rPr lang="en-US" sz="2400" dirty="0"/>
-                        <a:t>Itemization</a:t>
-                      </a:r>
-                    </a:p>
-                  </a:txBody>
-                  <a:tcPr/>
-                </a:tc>
-                <a:tc>
-                  <a:txBody>
-                    <a:bodyPr/>
-                    <a:lstStyle/>
-                    <a:p>
-                      <a:r>
-                        <a:rPr lang="en-US" sz="2400" kern="1200" dirty="0">
-                          <a:solidFill>
-                            <a:schemeClr val="dk1"/>
-                          </a:solidFill>
-                          <a:effectLst/>
-                          <a:latin typeface="+mn-lt"/>
-                          <a:ea typeface="+mn-ea"/>
-                          <a:cs typeface="+mn-cs"/>
-                        </a:rPr>
-                        <a:t>Traffic Light state (red, yellow, </a:t>
-                      </a:r>
-                      <a:r>
-                        <a:rPr lang="en-US" sz="2400" kern="1200" dirty="0">
-                          <a:solidFill>
-                            <a:srgbClr val="FF0000"/>
-                          </a:solidFill>
-                          <a:effectLst/>
-                          <a:latin typeface="+mn-lt"/>
-                          <a:ea typeface="+mn-ea"/>
-                          <a:cs typeface="+mn-cs"/>
-                        </a:rPr>
-                        <a:t>OR</a:t>
-                      </a:r>
-                      <a:r>
-                        <a:rPr lang="en-US" sz="2400" kern="1200" baseline="0" dirty="0">
-                          <a:solidFill>
-                            <a:schemeClr val="dk1"/>
-                          </a:solidFill>
-                          <a:effectLst/>
-                          <a:latin typeface="+mn-lt"/>
-                          <a:ea typeface="+mn-ea"/>
-                          <a:cs typeface="+mn-cs"/>
-                        </a:rPr>
-                        <a:t> </a:t>
-                      </a:r>
-                      <a:r>
-                        <a:rPr lang="en-US" sz="2400" kern="1200" dirty="0">
-                          <a:solidFill>
-                            <a:schemeClr val="dk1"/>
-                          </a:solidFill>
-                          <a:effectLst/>
-                          <a:latin typeface="+mn-lt"/>
-                          <a:ea typeface="+mn-ea"/>
-                          <a:cs typeface="+mn-cs"/>
-                        </a:rPr>
-                        <a:t>green)</a:t>
-                      </a:r>
-                      <a:endParaRPr lang="en-US" sz="2400" dirty="0"/>
-                    </a:p>
-                  </a:txBody>
-                  <a:tcPr/>
-                </a:tc>
-                <a:extLst>
-                  <a:ext uri="{0D108BD9-81ED-4DB2-BD59-A6C34878D82A}">
-                    <a16:rowId xmlns:a16="http://schemas.microsoft.com/office/drawing/2014/main" val="10002"/>
-                  </a:ext>
-                </a:extLst>
-              </a:tr>
-              <a:tr h="370840">
-                <a:tc>
-                  <a:txBody>
-                    <a:bodyPr/>
-                    <a:lstStyle/>
-                    <a:p>
-                      <a:r>
-                        <a:rPr lang="en-US" sz="2400" dirty="0"/>
-                        <a:t>Compound</a:t>
-                      </a:r>
-                    </a:p>
-                  </a:txBody>
-                  <a:tcPr/>
-                </a:tc>
-                <a:tc>
-                  <a:txBody>
-                    <a:bodyPr/>
-                    <a:lstStyle/>
-                    <a:p>
-                      <a:r>
-                        <a:rPr lang="en-US" sz="2400" kern="1200" dirty="0">
-                          <a:solidFill>
-                            <a:schemeClr val="dk1"/>
-                          </a:solidFill>
-                          <a:effectLst/>
-                          <a:latin typeface="+mn-lt"/>
-                          <a:ea typeface="+mn-ea"/>
-                          <a:cs typeface="+mn-cs"/>
-                        </a:rPr>
-                        <a:t>Book (author, title, </a:t>
-                      </a:r>
-                      <a:r>
-                        <a:rPr lang="en-US" sz="2400" kern="1200" dirty="0">
-                          <a:solidFill>
-                            <a:srgbClr val="FF0000"/>
-                          </a:solidFill>
-                          <a:effectLst/>
-                          <a:latin typeface="+mn-lt"/>
-                          <a:ea typeface="+mn-ea"/>
-                          <a:cs typeface="+mn-cs"/>
-                        </a:rPr>
-                        <a:t>AND</a:t>
-                      </a:r>
-                      <a:r>
-                        <a:rPr lang="en-US" sz="2400" kern="1200" dirty="0">
-                          <a:solidFill>
-                            <a:schemeClr val="dk1"/>
-                          </a:solidFill>
-                          <a:effectLst/>
-                          <a:latin typeface="+mn-lt"/>
-                          <a:ea typeface="+mn-ea"/>
-                          <a:cs typeface="+mn-cs"/>
-                        </a:rPr>
-                        <a:t> copies)</a:t>
-                      </a:r>
-                      <a:endParaRPr lang="en-US" sz="2400" dirty="0"/>
-                    </a:p>
-                  </a:txBody>
-                  <a:tcPr/>
-                </a:tc>
-                <a:extLst>
-                  <a:ext uri="{0D108BD9-81ED-4DB2-BD59-A6C34878D82A}">
-                    <a16:rowId xmlns:a16="http://schemas.microsoft.com/office/drawing/2014/main" val="10003"/>
-                  </a:ext>
-                </a:extLst>
-              </a:tr>
-              <a:tr h="370840">
-                <a:tc>
-                  <a:txBody>
-                    <a:bodyPr/>
-                    <a:lstStyle/>
-                    <a:p>
-                      <a:r>
-                        <a:rPr lang="en-US" sz="2400" dirty="0"/>
-                        <a:t>Mixed</a:t>
-                      </a:r>
-                    </a:p>
-                  </a:txBody>
-                  <a:tcPr/>
-                </a:tc>
-                <a:tc>
-                  <a:txBody>
-                    <a:bodyPr/>
-                    <a:lstStyle/>
-                    <a:p>
-                      <a:pPr marL="0" marR="0" indent="0" algn="l" defTabSz="457200" rtl="0" eaLnBrk="1" fontAlgn="auto" latinLnBrk="0" hangingPunct="1">
-                        <a:lnSpc>
-                          <a:spcPct val="100000"/>
-                        </a:lnSpc>
-                        <a:spcBef>
-                          <a:spcPts val="0"/>
-                        </a:spcBef>
-                        <a:spcAft>
-                          <a:spcPts val="0"/>
-                        </a:spcAft>
-                        <a:buClrTx/>
-                        <a:buSzTx/>
-                        <a:buFontTx/>
-                        <a:buNone/>
-                        <a:tabLst/>
-                        <a:defRPr/>
-                      </a:pPr>
-                      <a:r>
-                        <a:rPr lang="en-US" sz="2400" kern="1200" dirty="0" err="1">
-                          <a:solidFill>
-                            <a:schemeClr val="dk1"/>
-                          </a:solidFill>
-                          <a:effectLst/>
-                          <a:latin typeface="+mn-lt"/>
-                          <a:ea typeface="+mn-ea"/>
-                          <a:cs typeface="+mn-cs"/>
-                        </a:rPr>
-                        <a:t>BarOrder</a:t>
-                      </a:r>
-                      <a:r>
-                        <a:rPr lang="en-US" sz="2400" kern="1200" dirty="0">
-                          <a:solidFill>
-                            <a:schemeClr val="dk1"/>
-                          </a:solidFill>
-                          <a:effectLst/>
-                          <a:latin typeface="+mn-lt"/>
-                          <a:ea typeface="+mn-ea"/>
-                          <a:cs typeface="+mn-cs"/>
-                        </a:rPr>
-                        <a:t> (coffee (</a:t>
-                      </a:r>
-                      <a:r>
-                        <a:rPr lang="en-US" sz="2400" kern="1200" dirty="0">
-                          <a:solidFill>
-                            <a:schemeClr val="accent3">
-                              <a:lumMod val="75000"/>
-                            </a:schemeClr>
-                          </a:solidFill>
-                          <a:effectLst/>
-                          <a:latin typeface="+mn-lt"/>
-                          <a:ea typeface="+mn-ea"/>
-                          <a:cs typeface="+mn-cs"/>
-                        </a:rPr>
-                        <a:t>compound</a:t>
-                      </a:r>
-                      <a:r>
-                        <a:rPr lang="en-US" sz="2400" kern="1200" dirty="0">
-                          <a:solidFill>
-                            <a:schemeClr val="dk1"/>
-                          </a:solidFill>
-                          <a:effectLst/>
-                          <a:latin typeface="+mn-lt"/>
-                          <a:ea typeface="+mn-ea"/>
-                          <a:cs typeface="+mn-cs"/>
-                        </a:rPr>
-                        <a:t>), </a:t>
-                      </a:r>
-                    </a:p>
-                    <a:p>
-                      <a:pPr marL="0" marR="0" indent="0" algn="l" defTabSz="457200" rtl="0" eaLnBrk="1" fontAlgn="auto" latinLnBrk="0" hangingPunct="1">
-                        <a:lnSpc>
-                          <a:spcPct val="100000"/>
-                        </a:lnSpc>
-                        <a:spcBef>
-                          <a:spcPts val="0"/>
-                        </a:spcBef>
-                        <a:spcAft>
-                          <a:spcPts val="0"/>
-                        </a:spcAft>
-                        <a:buClrTx/>
-                        <a:buSzTx/>
-                        <a:buFontTx/>
-                        <a:buNone/>
-                        <a:tabLst/>
-                        <a:defRPr/>
-                      </a:pPr>
-                      <a:r>
-                        <a:rPr lang="en-US" sz="2400" kern="1200" dirty="0">
-                          <a:solidFill>
-                            <a:schemeClr val="dk1"/>
-                          </a:solidFill>
-                          <a:effectLst/>
-                          <a:latin typeface="+mn-lt"/>
-                          <a:ea typeface="+mn-ea"/>
-                          <a:cs typeface="+mn-cs"/>
-                        </a:rPr>
-                        <a:t>            </a:t>
-                      </a:r>
-                      <a:r>
-                        <a:rPr lang="en-US" sz="2400" kern="1200" dirty="0">
-                          <a:solidFill>
-                            <a:srgbClr val="FF0000"/>
-                          </a:solidFill>
-                          <a:effectLst/>
-                          <a:latin typeface="+mn-lt"/>
-                          <a:ea typeface="+mn-ea"/>
-                          <a:cs typeface="+mn-cs"/>
-                        </a:rPr>
-                        <a:t>OR</a:t>
-                      </a:r>
-                      <a:r>
-                        <a:rPr lang="en-US" sz="2400" kern="1200" dirty="0">
-                          <a:solidFill>
-                            <a:schemeClr val="dk1"/>
-                          </a:solidFill>
-                          <a:effectLst/>
-                          <a:latin typeface="+mn-lt"/>
-                          <a:ea typeface="+mn-ea"/>
-                          <a:cs typeface="+mn-cs"/>
-                        </a:rPr>
-                        <a:t> wine (</a:t>
-                      </a:r>
-                      <a:r>
-                        <a:rPr lang="en-US" sz="2400" kern="1200" dirty="0">
-                          <a:solidFill>
-                            <a:schemeClr val="accent3">
-                              <a:lumMod val="75000"/>
-                            </a:schemeClr>
-                          </a:solidFill>
-                          <a:effectLst/>
-                          <a:latin typeface="+mn-lt"/>
-                          <a:ea typeface="+mn-ea"/>
-                          <a:cs typeface="+mn-cs"/>
-                        </a:rPr>
-                        <a:t>compound</a:t>
-                      </a:r>
-                      <a:r>
-                        <a:rPr lang="en-US" sz="2400" kern="1200" dirty="0">
-                          <a:solidFill>
-                            <a:schemeClr val="dk1"/>
-                          </a:solidFill>
-                          <a:effectLst/>
-                          <a:latin typeface="+mn-lt"/>
-                          <a:ea typeface="+mn-ea"/>
-                          <a:cs typeface="+mn-cs"/>
-                        </a:rPr>
-                        <a:t>) </a:t>
-                      </a:r>
-                    </a:p>
-                    <a:p>
-                      <a:pPr marL="0" marR="0" indent="0" algn="l" defTabSz="457200" rtl="0" eaLnBrk="1" fontAlgn="auto" latinLnBrk="0" hangingPunct="1">
-                        <a:lnSpc>
-                          <a:spcPct val="100000"/>
-                        </a:lnSpc>
-                        <a:spcBef>
-                          <a:spcPts val="0"/>
-                        </a:spcBef>
-                        <a:spcAft>
-                          <a:spcPts val="0"/>
-                        </a:spcAft>
-                        <a:buClrTx/>
-                        <a:buSzTx/>
-                        <a:buFontTx/>
-                        <a:buNone/>
-                        <a:tabLst/>
-                        <a:defRPr/>
-                      </a:pPr>
-                      <a:r>
-                        <a:rPr lang="en-US" sz="2400" kern="1200" dirty="0">
-                          <a:solidFill>
-                            <a:schemeClr val="dk1"/>
-                          </a:solidFill>
-                          <a:effectLst/>
-                          <a:latin typeface="+mn-lt"/>
-                          <a:ea typeface="+mn-ea"/>
-                          <a:cs typeface="+mn-cs"/>
-                        </a:rPr>
-                        <a:t>            </a:t>
-                      </a:r>
-                      <a:r>
-                        <a:rPr lang="en-US" sz="2400" kern="1200" dirty="0">
-                          <a:solidFill>
-                            <a:srgbClr val="FF0000"/>
-                          </a:solidFill>
-                          <a:effectLst/>
-                          <a:latin typeface="+mn-lt"/>
-                          <a:ea typeface="+mn-ea"/>
-                          <a:cs typeface="+mn-cs"/>
-                        </a:rPr>
-                        <a:t>OR</a:t>
-                      </a:r>
-                      <a:r>
-                        <a:rPr lang="en-US" sz="2400" kern="1200" dirty="0">
-                          <a:solidFill>
-                            <a:schemeClr val="dk1"/>
-                          </a:solidFill>
-                          <a:effectLst/>
-                          <a:latin typeface="+mn-lt"/>
-                          <a:ea typeface="+mn-ea"/>
-                          <a:cs typeface="+mn-cs"/>
-                        </a:rPr>
-                        <a:t> tea (</a:t>
-                      </a:r>
-                      <a:r>
-                        <a:rPr lang="en-US" sz="2400" kern="1200" dirty="0">
-                          <a:solidFill>
-                            <a:schemeClr val="accent3">
-                              <a:lumMod val="75000"/>
-                            </a:schemeClr>
-                          </a:solidFill>
-                          <a:effectLst/>
-                          <a:latin typeface="+mn-lt"/>
-                          <a:ea typeface="+mn-ea"/>
-                          <a:cs typeface="+mn-cs"/>
-                        </a:rPr>
-                        <a:t>compound</a:t>
-                      </a:r>
-                      <a:r>
-                        <a:rPr lang="en-US" sz="2400" kern="1200" dirty="0">
-                          <a:solidFill>
-                            <a:schemeClr val="dk1"/>
-                          </a:solidFill>
-                          <a:effectLst/>
-                          <a:latin typeface="+mn-lt"/>
-                          <a:ea typeface="+mn-ea"/>
-                          <a:cs typeface="+mn-cs"/>
-                        </a:rPr>
-                        <a:t>))</a:t>
-                      </a:r>
-                    </a:p>
-                  </a:txBody>
-                  <a:tcPr/>
-                </a:tc>
-                <a:extLst>
-                  <a:ext uri="{0D108BD9-81ED-4DB2-BD59-A6C34878D82A}">
-                    <a16:rowId xmlns:a16="http://schemas.microsoft.com/office/drawing/2014/main" val="10004"/>
-                  </a:ext>
-                </a:extLst>
-              </a:tr>
-            </a:tbl>
-          </a:graphicData>
-        </a:graphic>
-      </p:graphicFrame>
-      <p:sp>
-        <p:nvSpPr>
-          <p:cNvPr id="3" name="Slide Number Placeholder 2"/>
+              <a:t>In a wine bar, an order may be one of three things: a cup of coffee, a glass of wine, or a cup of tea. </a:t>
+            </a:r>
+          </a:p>
+          <a:p>
+            <a:pPr lvl="1"/>
+            <a:r>
+              <a:rPr lang="en-US" dirty="0"/>
+              <a:t>For the coffee, we need to specify the size (small, medium, or large) and type (this is a fancy bar, so it carries many types of coffee).  Also whether or not it should be served with milk.</a:t>
+            </a:r>
+          </a:p>
+          <a:p>
+            <a:pPr lvl="1"/>
+            <a:r>
+              <a:rPr lang="en-US" dirty="0"/>
+              <a:t>For the wine, we need to specify which vineyard and which year.  </a:t>
+            </a:r>
+          </a:p>
+          <a:p>
+            <a:pPr lvl="1"/>
+            <a:r>
+              <a:rPr lang="en-US" dirty="0"/>
+              <a:t>For tea, we need the size of the cup and the type of tea (this is a fancy bar, so it carries many types of tea).</a:t>
+            </a:r>
+          </a:p>
+          <a:p>
+            <a:endParaRPr lang="en-US" dirty="0"/>
+          </a:p>
+          <a:p>
+            <a:endParaRPr lang="en-US" dirty="0"/>
+          </a:p>
+        </p:txBody>
+      </p:sp>
+      <p:sp>
+        <p:nvSpPr>
+          <p:cNvPr id="4" name="Slide Number Placeholder 3"/>
           <p:cNvSpPr>
             <a:spLocks noGrp="1"/>
           </p:cNvSpPr>
@@ -5345,7 +4855,7 @@
     </p:spTree>
     <p:extLst>
       <p:ext uri="{BB962C8B-B14F-4D97-AF65-F5344CB8AC3E}">
-        <p14:creationId xmlns:p14="http://schemas.microsoft.com/office/powerpoint/2010/main" val="640731812"/>
+        <p14:creationId xmlns:p14="http://schemas.microsoft.com/office/powerpoint/2010/main" val="3984661016"/>
       </p:ext>
     </p:extLst>
   </p:cSld>
@@ -5389,6 +4899,121 @@
           <a:p>
             <a:r>
               <a:rPr lang="en-US" dirty="0"/>
+              <a:t>Looking ahead</a:t>
+            </a:r>
+          </a:p>
+        </p:txBody>
+      </p:sp>
+      <p:sp>
+        <p:nvSpPr>
+          <p:cNvPr id="3" name="Content Placeholder 2"/>
+          <p:cNvSpPr>
+            <a:spLocks noGrp="1"/>
+          </p:cNvSpPr>
+          <p:nvPr>
+            <p:ph idx="1"/>
+          </p:nvPr>
+        </p:nvSpPr>
+        <p:spPr/>
+        <p:txBody>
+          <a:bodyPr/>
+          <a:lstStyle/>
+          <a:p>
+            <a:r>
+              <a:rPr lang="en-US" dirty="0"/>
+              <a:t>In the next lesson, we’ll learn how to write down your design in the form of a </a:t>
+            </a:r>
+            <a:r>
+              <a:rPr lang="en-US" i="1" dirty="0">
+                <a:solidFill>
+                  <a:srgbClr val="FF0000"/>
+                </a:solidFill>
+              </a:rPr>
+              <a:t>data definition</a:t>
+            </a:r>
+            <a:r>
+              <a:rPr lang="en-US" i="1" dirty="0"/>
+              <a:t>.</a:t>
+            </a:r>
+            <a:endParaRPr lang="en-US" i="1" dirty="0">
+              <a:solidFill>
+                <a:srgbClr val="FF0000"/>
+              </a:solidFill>
+            </a:endParaRPr>
+          </a:p>
+        </p:txBody>
+      </p:sp>
+      <p:sp>
+        <p:nvSpPr>
+          <p:cNvPr id="4" name="Slide Number Placeholder 3"/>
+          <p:cNvSpPr>
+            <a:spLocks noGrp="1"/>
+          </p:cNvSpPr>
+          <p:nvPr>
+            <p:ph type="sldNum" sz="quarter" idx="12"/>
+          </p:nvPr>
+        </p:nvSpPr>
+        <p:spPr/>
+        <p:txBody>
+          <a:bodyPr/>
+          <a:lstStyle/>
+          <a:p>
+            <a:fld id="{8D704B19-8EED-495A-99FA-12E5518CCC54}" type="slidenum">
+              <a:rPr lang="en-US" smtClean="0"/>
+              <a:pPr/>
+              <a:t>14</a:t>
+            </a:fld>
+            <a:endParaRPr lang="en-US"/>
+          </a:p>
+        </p:txBody>
+      </p:sp>
+    </p:spTree>
+    <p:extLst>
+      <p:ext uri="{BB962C8B-B14F-4D97-AF65-F5344CB8AC3E}">
+        <p14:creationId xmlns:p14="http://schemas.microsoft.com/office/powerpoint/2010/main" val="496657645"/>
+      </p:ext>
+    </p:extLst>
+  </p:cSld>
+  <p:clrMapOvr>
+    <a:masterClrMapping/>
+  </p:clrMapOvr>
+</p:sld>
+</file>
+
+<file path=ppt/slides/slide15.xml><?xml version="1.0" encoding="utf-8"?>
+<p:sld xmlns:a="http://schemas.openxmlformats.org/drawingml/2006/main" xmlns:r="http://schemas.openxmlformats.org/officeDocument/2006/relationships" xmlns:p="http://schemas.openxmlformats.org/presentationml/2006/main">
+  <p:cSld>
+    <p:spTree>
+      <p:nvGrpSpPr>
+        <p:cNvPr id="1" name=""/>
+        <p:cNvGrpSpPr/>
+        <p:nvPr/>
+      </p:nvGrpSpPr>
+      <p:grpSpPr>
+        <a:xfrm>
+          <a:off x="0" y="0"/>
+          <a:ext cx="0" cy="0"/>
+          <a:chOff x="0" y="0"/>
+          <a:chExt cx="0" cy="0"/>
+        </a:xfrm>
+      </p:grpSpPr>
+      <p:sp>
+        <p:nvSpPr>
+          <p:cNvPr id="2" name="Title 1"/>
+          <p:cNvSpPr>
+            <a:spLocks noGrp="1"/>
+          </p:cNvSpPr>
+          <p:nvPr>
+            <p:ph type="title"/>
+          </p:nvPr>
+        </p:nvSpPr>
+        <p:spPr/>
+        <p:txBody>
+          <a:bodyPr/>
+          <a:lstStyle/>
+          <a:p>
+            <a:r>
+              <a:rPr lang="en-US" dirty="0"/>
               <a:t>Next Steps</a:t>
             </a:r>
           </a:p>
@@ -5411,11 +5036,7 @@
           <a:p>
             <a:r>
               <a:rPr lang="en-US" dirty="0"/>
-              <a:t>Do </a:t>
-            </a:r>
-            <a:r>
-              <a:rPr lang="en-US"/>
-              <a:t>Guided Practice 1.1</a:t>
+              <a:t>Do Guided Practice 1.1</a:t>
             </a:r>
           </a:p>
           <a:p>
@@ -5449,7 +5070,7 @@
           <a:p>
             <a:fld id="{2AF3B5EA-18B6-4040-9F78-6052AF49C681}" type="slidenum">
               <a:rPr lang="en-US" smtClean="0"/>
-              <a:t>14</a:t>
+              <a:t>15</a:t>
             </a:fld>
             <a:endParaRPr lang="en-US"/>
           </a:p>
@@ -5540,14 +5161,7 @@
             <a:pPr lvl="1"/>
             <a:r>
               <a:rPr lang="en-US" dirty="0"/>
-              <a:t>list the steps of the data design recipe.</a:t>
-            </a:r>
-          </a:p>
-          <a:p>
-            <a:pPr lvl="1"/>
-            <a:r>
-              <a:rPr lang="en-US" dirty="0"/>
-              <a:t>define scalar, compound, itemization, and mixed data and give examples of each.</a:t>
+              <a:t>define scalar, compound, and itemization data and give examples of each one.</a:t>
             </a:r>
           </a:p>
         </p:txBody>
@@ -6157,28 +5771,6 @@
           <a:chExt cx="0" cy="0"/>
         </a:xfrm>
       </p:grpSpPr>
-      <p:sp>
-        <p:nvSpPr>
-          <p:cNvPr id="2" name="Title 1"/>
-          <p:cNvSpPr>
-            <a:spLocks noGrp="1"/>
-          </p:cNvSpPr>
-          <p:nvPr>
-            <p:ph type="title"/>
-          </p:nvPr>
-        </p:nvSpPr>
-        <p:spPr/>
-        <p:txBody>
-          <a:bodyPr/>
-          <a:lstStyle/>
-          <a:p>
-            <a:r>
-              <a:rPr lang="en-US" dirty="0"/>
-              <a:t>Kinds of Data</a:t>
-            </a:r>
-          </a:p>
-        </p:txBody>
-      </p:sp>
       <p:graphicFrame>
         <p:nvGraphicFramePr>
           <p:cNvPr id="4" name="Content Placeholder 3"/>
@@ -6187,12 +5779,16 @@
           </p:cNvGraphicFramePr>
           <p:nvPr>
             <p:ph idx="1"/>
-            <p:extLst/>
+            <p:extLst>
+              <p:ext uri="{D42A27DB-BD31-4B8C-83A1-F6EECF244321}">
+                <p14:modId xmlns:p14="http://schemas.microsoft.com/office/powerpoint/2010/main" val="1261082367"/>
+              </p:ext>
+            </p:extLst>
           </p:nvPr>
         </p:nvGraphicFramePr>
         <p:xfrm>
           <a:off x="457200" y="1600200"/>
-          <a:ext cx="8229600" cy="4632960"/>
+          <a:ext cx="8229600" cy="4053840"/>
         </p:xfrm>
         <a:graphic>
           <a:graphicData uri="http://schemas.openxmlformats.org/drawingml/2006/table">
@@ -6303,27 +5899,7 @@
                     <a:p>
                       <a:r>
                         <a:rPr lang="en-US" sz="3200" dirty="0"/>
-                        <a:t>4. Mixed Data</a:t>
-                      </a:r>
-                    </a:p>
-                  </a:txBody>
-                  <a:tcPr/>
-                </a:tc>
-                <a:extLst>
-                  <a:ext uri="{0D108BD9-81ED-4DB2-BD59-A6C34878D82A}">
-                    <a16:rowId xmlns:a16="http://schemas.microsoft.com/office/drawing/2014/main" val="10004"/>
-                  </a:ext>
-                </a:extLst>
-              </a:tr>
-              <a:tr h="370840">
-                <a:tc>
-                  <a:txBody>
-                    <a:bodyPr/>
-                    <a:lstStyle/>
-                    <a:p>
-                      <a:r>
-                        <a:rPr lang="en-US" sz="3200" dirty="0"/>
-                        <a:t>5. Recursive Data</a:t>
+                        <a:t>4. Recursive Data</a:t>
                       </a:r>
                     </a:p>
                   </a:txBody>
@@ -6343,7 +5919,7 @@
                     <a:p>
                       <a:r>
                         <a:rPr lang="en-US" sz="3200" dirty="0"/>
-                        <a:t>6. Mutually Recursive Data</a:t>
+                        <a:t>5. Mutually Recursive Data</a:t>
                       </a:r>
                     </a:p>
                   </a:txBody>
@@ -6363,7 +5939,7 @@
                     <a:p>
                       <a:r>
                         <a:rPr lang="en-US" sz="3200" dirty="0"/>
-                        <a:t>7. Functional</a:t>
+                        <a:t>6. Functional</a:t>
                       </a:r>
                       <a:r>
                         <a:rPr lang="en-US" sz="3200" baseline="0" dirty="0"/>
@@ -6386,6 +5962,28 @@
       </p:graphicFrame>
       <p:sp>
         <p:nvSpPr>
+          <p:cNvPr id="2" name="Title 1"/>
+          <p:cNvSpPr>
+            <a:spLocks noGrp="1"/>
+          </p:cNvSpPr>
+          <p:nvPr>
+            <p:ph type="title"/>
+          </p:nvPr>
+        </p:nvSpPr>
+        <p:spPr/>
+        <p:txBody>
+          <a:bodyPr/>
+          <a:lstStyle/>
+          <a:p>
+            <a:r>
+              <a:rPr lang="en-US" dirty="0"/>
+              <a:t>Kinds of Data</a:t>
+            </a:r>
+          </a:p>
+        </p:txBody>
+      </p:sp>
+      <p:sp>
+        <p:nvSpPr>
           <p:cNvPr id="5" name="Rounded Rectangle 4"/>
           <p:cNvSpPr/>
           <p:nvPr/>
@@ -6393,7 +5991,7 @@
         <p:spPr>
           <a:xfrm>
             <a:off x="446590" y="2209800"/>
-            <a:ext cx="8240210" cy="2286000"/>
+            <a:ext cx="8240210" cy="1676400"/>
           </a:xfrm>
           <a:prstGeom prst="roundRect">
             <a:avLst>

</xml_diff>